<commit_message>
Updated presentation, report, and pdfs
</commit_message>
<xml_diff>
--- a/Alexa_JamesFrancis_Presentation.pptx
+++ b/Alexa_JamesFrancis_Presentation.pptx
@@ -9144,59 +9144,64 @@
           <a:p>
             <a:r>
               <a:rPr lang="en-US" dirty="0"/>
-              <a:t>GitHub Repositories with all artifacts</a:t>
-            </a:r>
-          </a:p>
-          <a:p>
-            <a:pPr lvl="1"/>
-            <a:r>
-              <a:rPr lang="en-US" dirty="0" err="1"/>
-              <a:t>PharmAid</a:t>
-            </a:r>
-            <a:r>
-              <a:rPr lang="en-US" dirty="0"/>
-              <a:t> (includes Alexa JSON): </a:t>
-            </a:r>
+              <a:t>GitHub Repositories with all artifacts:</a:t>
+            </a:r>
+          </a:p>
+          <a:p>
+            <a:pPr marL="400050" lvl="1" indent="0">
+              <a:buNone/>
+            </a:pPr>
             <a:r>
               <a:rPr lang="en-US" dirty="0">
                 <a:hlinkClick r:id="rId4"/>
               </a:rPr>
-              <a:t>https://github.com/james-francis/PharmAid</a:t>
+              <a:t>https://github.com/james-francis/DeepAzure-FinalProject</a:t>
             </a:r>
             <a:endParaRPr lang="en-US" dirty="0"/>
           </a:p>
           <a:p>
-            <a:pPr lvl="1"/>
-            <a:r>
-              <a:rPr lang="en-US" dirty="0"/>
-              <a:t>PharmApi: </a:t>
+            <a:pPr marL="0" indent="0">
+              <a:buNone/>
+            </a:pPr>
+            <a:endParaRPr lang="en-US" dirty="0"/>
+          </a:p>
+          <a:p>
+            <a:pPr marL="0" indent="0">
+              <a:buNone/>
+            </a:pPr>
+            <a:r>
+              <a:rPr lang="en-US" dirty="0"/>
+              <a:t>Separate GitHub URLs for cloning</a:t>
+            </a:r>
+          </a:p>
+          <a:p>
+            <a:r>
+              <a:rPr lang="en-US" dirty="0" err="1"/>
+              <a:t>PharmAid</a:t>
+            </a:r>
+            <a:r>
+              <a:rPr lang="en-US" dirty="0"/>
+              <a:t> (includes Alexa JSON): </a:t>
             </a:r>
             <a:r>
               <a:rPr lang="en-US" dirty="0">
                 <a:hlinkClick r:id="rId5"/>
               </a:rPr>
-              <a:t>https://github.com/james-francis/PharmApi</a:t>
+              <a:t>https://github.com/james-francis/PharmAid</a:t>
             </a:r>
             <a:endParaRPr lang="en-US" dirty="0"/>
           </a:p>
           <a:p>
-            <a:pPr lvl="1"/>
-            <a:r>
-              <a:rPr lang="en-US" dirty="0"/>
-              <a:t>Documentation: </a:t>
+            <a:r>
+              <a:rPr lang="en-US" dirty="0"/>
+              <a:t>PharmApi: </a:t>
             </a:r>
             <a:r>
               <a:rPr lang="en-US" dirty="0">
                 <a:hlinkClick r:id="rId6"/>
               </a:rPr>
-              <a:t>https://github.com/james-francis/DeepAzure-FinalProject</a:t>
-            </a:r>
-            <a:endParaRPr lang="en-US" dirty="0"/>
-          </a:p>
-          <a:p>
-            <a:pPr marL="457200" lvl="1" indent="0">
-              <a:buNone/>
-            </a:pPr>
+              <a:t>https://github.com/james-francis/PharmApi</a:t>
+            </a:r>
             <a:endParaRPr lang="en-US" dirty="0"/>
           </a:p>
         </p:txBody>

</xml_diff>